<commit_message>
updated syllabus and week 2 lecture slides
</commit_message>
<xml_diff>
--- a/Week_2/Lecture_1_Geoprocessing_and_Python_Window.pptx
+++ b/Week_2/Lecture_1_Geoprocessing_and_Python_Window.pptx
@@ -9,16 +9,23 @@
     <p:sldId id="257" r:id="rId3"/>
     <p:sldId id="259" r:id="rId4"/>
     <p:sldId id="260" r:id="rId5"/>
-    <p:sldId id="261" r:id="rId6"/>
-    <p:sldId id="262" r:id="rId7"/>
-    <p:sldId id="263" r:id="rId8"/>
-    <p:sldId id="264" r:id="rId9"/>
-    <p:sldId id="265" r:id="rId10"/>
-    <p:sldId id="266" r:id="rId11"/>
-    <p:sldId id="267" r:id="rId12"/>
-    <p:sldId id="268" r:id="rId13"/>
-    <p:sldId id="269" r:id="rId14"/>
-    <p:sldId id="258" r:id="rId15"/>
+    <p:sldId id="270" r:id="rId6"/>
+    <p:sldId id="261" r:id="rId7"/>
+    <p:sldId id="271" r:id="rId8"/>
+    <p:sldId id="272" r:id="rId9"/>
+    <p:sldId id="262" r:id="rId10"/>
+    <p:sldId id="263" r:id="rId11"/>
+    <p:sldId id="264" r:id="rId12"/>
+    <p:sldId id="265" r:id="rId13"/>
+    <p:sldId id="266" r:id="rId14"/>
+    <p:sldId id="267" r:id="rId15"/>
+    <p:sldId id="268" r:id="rId16"/>
+    <p:sldId id="273" r:id="rId17"/>
+    <p:sldId id="274" r:id="rId18"/>
+    <p:sldId id="275" r:id="rId19"/>
+    <p:sldId id="276" r:id="rId20"/>
+    <p:sldId id="277" r:id="rId21"/>
+    <p:sldId id="269" r:id="rId22"/>
   </p:sldIdLst>
   <p:sldSz cx="12192000" cy="6858000"/>
   <p:notesSz cx="6858000" cy="9144000"/>
@@ -117,6 +124,11 @@
       </a:defRPr>
     </a:lvl9pPr>
   </p:defaultTextStyle>
+  <p:extLst>
+    <p:ext uri="{EFAFB233-063F-42B5-8137-9DF3F51BA10A}">
+      <p15:sldGuideLst xmlns:p15="http://schemas.microsoft.com/office/powerpoint/2012/main"/>
+    </p:ext>
+  </p:extLst>
 </p:presentation>
 </file>
 
@@ -251,7 +263,7 @@
           <a:p>
             <a:fld id="{513F8C17-1AD3-453B-90A8-31E7DAAD0F81}" type="datetimeFigureOut">
               <a:rPr lang="en-US" smtClean="0"/>
-              <a:t>1/8/2017</a:t>
+              <a:t>1/11/2017</a:t>
             </a:fld>
             <a:endParaRPr lang="en-US"/>
           </a:p>
@@ -421,7 +433,7 @@
           <a:p>
             <a:fld id="{513F8C17-1AD3-453B-90A8-31E7DAAD0F81}" type="datetimeFigureOut">
               <a:rPr lang="en-US" smtClean="0"/>
-              <a:t>1/8/2017</a:t>
+              <a:t>1/11/2017</a:t>
             </a:fld>
             <a:endParaRPr lang="en-US"/>
           </a:p>
@@ -601,7 +613,7 @@
           <a:p>
             <a:fld id="{513F8C17-1AD3-453B-90A8-31E7DAAD0F81}" type="datetimeFigureOut">
               <a:rPr lang="en-US" smtClean="0"/>
-              <a:t>1/8/2017</a:t>
+              <a:t>1/11/2017</a:t>
             </a:fld>
             <a:endParaRPr lang="en-US"/>
           </a:p>
@@ -771,7 +783,7 @@
           <a:p>
             <a:fld id="{513F8C17-1AD3-453B-90A8-31E7DAAD0F81}" type="datetimeFigureOut">
               <a:rPr lang="en-US" smtClean="0"/>
-              <a:t>1/8/2017</a:t>
+              <a:t>1/11/2017</a:t>
             </a:fld>
             <a:endParaRPr lang="en-US"/>
           </a:p>
@@ -1017,7 +1029,7 @@
           <a:p>
             <a:fld id="{513F8C17-1AD3-453B-90A8-31E7DAAD0F81}" type="datetimeFigureOut">
               <a:rPr lang="en-US" smtClean="0"/>
-              <a:t>1/8/2017</a:t>
+              <a:t>1/11/2017</a:t>
             </a:fld>
             <a:endParaRPr lang="en-US"/>
           </a:p>
@@ -1249,7 +1261,7 @@
           <a:p>
             <a:fld id="{513F8C17-1AD3-453B-90A8-31E7DAAD0F81}" type="datetimeFigureOut">
               <a:rPr lang="en-US" smtClean="0"/>
-              <a:t>1/8/2017</a:t>
+              <a:t>1/11/2017</a:t>
             </a:fld>
             <a:endParaRPr lang="en-US"/>
           </a:p>
@@ -1616,7 +1628,7 @@
           <a:p>
             <a:fld id="{513F8C17-1AD3-453B-90A8-31E7DAAD0F81}" type="datetimeFigureOut">
               <a:rPr lang="en-US" smtClean="0"/>
-              <a:t>1/8/2017</a:t>
+              <a:t>1/11/2017</a:t>
             </a:fld>
             <a:endParaRPr lang="en-US"/>
           </a:p>
@@ -1734,7 +1746,7 @@
           <a:p>
             <a:fld id="{513F8C17-1AD3-453B-90A8-31E7DAAD0F81}" type="datetimeFigureOut">
               <a:rPr lang="en-US" smtClean="0"/>
-              <a:t>1/8/2017</a:t>
+              <a:t>1/11/2017</a:t>
             </a:fld>
             <a:endParaRPr lang="en-US"/>
           </a:p>
@@ -1829,7 +1841,7 @@
           <a:p>
             <a:fld id="{513F8C17-1AD3-453B-90A8-31E7DAAD0F81}" type="datetimeFigureOut">
               <a:rPr lang="en-US" smtClean="0"/>
-              <a:t>1/8/2017</a:t>
+              <a:t>1/11/2017</a:t>
             </a:fld>
             <a:endParaRPr lang="en-US"/>
           </a:p>
@@ -2106,7 +2118,7 @@
           <a:p>
             <a:fld id="{513F8C17-1AD3-453B-90A8-31E7DAAD0F81}" type="datetimeFigureOut">
               <a:rPr lang="en-US" smtClean="0"/>
-              <a:t>1/8/2017</a:t>
+              <a:t>1/11/2017</a:t>
             </a:fld>
             <a:endParaRPr lang="en-US"/>
           </a:p>
@@ -2359,7 +2371,7 @@
           <a:p>
             <a:fld id="{513F8C17-1AD3-453B-90A8-31E7DAAD0F81}" type="datetimeFigureOut">
               <a:rPr lang="en-US" smtClean="0"/>
-              <a:t>1/8/2017</a:t>
+              <a:t>1/11/2017</a:t>
             </a:fld>
             <a:endParaRPr lang="en-US"/>
           </a:p>
@@ -2572,7 +2584,7 @@
           <a:p>
             <a:fld id="{513F8C17-1AD3-453B-90A8-31E7DAAD0F81}" type="datetimeFigureOut">
               <a:rPr lang="en-US" smtClean="0"/>
-              <a:t>1/8/2017</a:t>
+              <a:t>1/11/2017</a:t>
             </a:fld>
             <a:endParaRPr lang="en-US"/>
           </a:p>
@@ -3063,7 +3075,7 @@
       </p:grpSpPr>
       <p:sp>
         <p:nvSpPr>
-          <p:cNvPr id="4" name="Title 3"/>
+          <p:cNvPr id="2" name="Title 1"/>
           <p:cNvSpPr>
             <a:spLocks noGrp="1"/>
           </p:cNvSpPr>
@@ -3078,7 +3090,7 @@
           <a:p>
             <a:r>
               <a:rPr lang="en-US" dirty="0" smtClean="0"/>
-              <a:t>Python Window in ArcMap</a:t>
+              <a:t>Scripts as Tools</a:t>
             </a:r>
             <a:endParaRPr lang="en-US" dirty="0"/>
           </a:p>
@@ -3086,7 +3098,7 @@
       </p:sp>
       <p:sp>
         <p:nvSpPr>
-          <p:cNvPr id="5" name="Content Placeholder 4"/>
+          <p:cNvPr id="3" name="Content Placeholder 2"/>
           <p:cNvSpPr>
             <a:spLocks noGrp="1"/>
           </p:cNvSpPr>
@@ -3103,10 +3115,40 @@
           </a:p>
         </p:txBody>
       </p:sp>
+      <p:pic>
+        <p:nvPicPr>
+          <p:cNvPr id="4" name="Picture 3"/>
+          <p:cNvPicPr>
+            <a:picLocks noChangeAspect="1"/>
+          </p:cNvPicPr>
+          <p:nvPr/>
+        </p:nvPicPr>
+        <p:blipFill>
+          <a:blip r:embed="rId2">
+            <a:extLst>
+              <a:ext uri="{28A0092B-C50C-407E-A947-70E740481C1C}">
+                <a14:useLocalDpi xmlns:a14="http://schemas.microsoft.com/office/drawing/2010/main" val="0"/>
+              </a:ext>
+            </a:extLst>
+          </a:blip>
+          <a:stretch>
+            <a:fillRect/>
+          </a:stretch>
+        </p:blipFill>
+        <p:spPr>
+          <a:xfrm>
+            <a:off x="2004557" y="2503101"/>
+            <a:ext cx="7432212" cy="1498193"/>
+          </a:xfrm>
+          <a:prstGeom prst="rect">
+            <a:avLst/>
+          </a:prstGeom>
+        </p:spPr>
+      </p:pic>
     </p:spTree>
     <p:extLst>
       <p:ext uri="{BB962C8B-B14F-4D97-AF65-F5344CB8AC3E}">
-        <p14:creationId xmlns:p14="http://schemas.microsoft.com/office/powerpoint/2010/main" val="1057939983"/>
+        <p14:creationId xmlns:p14="http://schemas.microsoft.com/office/powerpoint/2010/main" val="2306883062"/>
       </p:ext>
     </p:extLst>
   </p:cSld>
@@ -3150,35 +3192,69 @@
           <a:p>
             <a:r>
               <a:rPr lang="en-US" dirty="0" smtClean="0"/>
-              <a:t>Writing Code</a:t>
+              <a:t>Scripts as Tools</a:t>
             </a:r>
             <a:endParaRPr lang="en-US" dirty="0"/>
           </a:p>
         </p:txBody>
       </p:sp>
-      <p:sp>
-        <p:nvSpPr>
-          <p:cNvPr id="3" name="Content Placeholder 2"/>
-          <p:cNvSpPr>
-            <a:spLocks noGrp="1"/>
-          </p:cNvSpPr>
+      <p:pic>
+        <p:nvPicPr>
+          <p:cNvPr id="5" name="Content Placeholder 4"/>
+          <p:cNvPicPr>
+            <a:picLocks noGrp="1" noChangeAspect="1"/>
+          </p:cNvPicPr>
           <p:nvPr>
             <p:ph idx="1"/>
           </p:nvPr>
-        </p:nvSpPr>
-        <p:spPr/>
-        <p:txBody>
-          <a:bodyPr/>
-          <a:lstStyle/>
-          <a:p>
-            <a:endParaRPr lang="en-US"/>
-          </a:p>
-        </p:txBody>
-      </p:sp>
+        </p:nvPicPr>
+        <p:blipFill>
+          <a:blip r:embed="rId2">
+            <a:extLst>
+              <a:ext uri="{28A0092B-C50C-407E-A947-70E740481C1C}">
+                <a14:useLocalDpi xmlns:a14="http://schemas.microsoft.com/office/drawing/2010/main" val="0"/>
+              </a:ext>
+            </a:extLst>
+          </a:blip>
+          <a:stretch>
+            <a:fillRect/>
+          </a:stretch>
+        </p:blipFill>
+        <p:spPr>
+          <a:xfrm>
+            <a:off x="5132070" y="3806984"/>
+            <a:ext cx="1927860" cy="388620"/>
+          </a:xfrm>
+        </p:spPr>
+      </p:pic>
+      <p:pic>
+        <p:nvPicPr>
+          <p:cNvPr id="4" name="Picture 3"/>
+          <p:cNvPicPr>
+            <a:picLocks noChangeAspect="1"/>
+          </p:cNvPicPr>
+          <p:nvPr/>
+        </p:nvPicPr>
+        <p:blipFill>
+          <a:blip r:embed="rId3"/>
+          <a:stretch>
+            <a:fillRect/>
+          </a:stretch>
+        </p:blipFill>
+        <p:spPr>
+          <a:xfrm>
+            <a:off x="102459" y="1611175"/>
+            <a:ext cx="11987081" cy="6742733"/>
+          </a:xfrm>
+          <a:prstGeom prst="rect">
+            <a:avLst/>
+          </a:prstGeom>
+        </p:spPr>
+      </p:pic>
     </p:spTree>
     <p:extLst>
       <p:ext uri="{BB962C8B-B14F-4D97-AF65-F5344CB8AC3E}">
-        <p14:creationId xmlns:p14="http://schemas.microsoft.com/office/powerpoint/2010/main" val="3607242760"/>
+        <p14:creationId xmlns:p14="http://schemas.microsoft.com/office/powerpoint/2010/main" val="2343102254"/>
       </p:ext>
     </p:extLst>
   </p:cSld>
@@ -3207,7 +3283,7 @@
       </p:grpSpPr>
       <p:sp>
         <p:nvSpPr>
-          <p:cNvPr id="2" name="Title 1"/>
+          <p:cNvPr id="4" name="Title 3"/>
           <p:cNvSpPr>
             <a:spLocks noGrp="1"/>
           </p:cNvSpPr>
@@ -3222,7 +3298,7 @@
           <a:p>
             <a:r>
               <a:rPr lang="en-US" dirty="0" smtClean="0"/>
-              <a:t>Getting Help</a:t>
+              <a:t>The Python Window</a:t>
             </a:r>
             <a:endParaRPr lang="en-US" dirty="0"/>
           </a:p>
@@ -3230,12 +3306,12 @@
       </p:sp>
       <p:sp>
         <p:nvSpPr>
-          <p:cNvPr id="3" name="Content Placeholder 2"/>
-          <p:cNvSpPr>
-            <a:spLocks noGrp="1"/>
-          </p:cNvSpPr>
-          <p:nvPr>
-            <p:ph idx="1"/>
+          <p:cNvPr id="5" name="Text Placeholder 4"/>
+          <p:cNvSpPr>
+            <a:spLocks noGrp="1"/>
+          </p:cNvSpPr>
+          <p:nvPr>
+            <p:ph type="body" idx="1"/>
           </p:nvPr>
         </p:nvSpPr>
         <p:spPr/>
@@ -3250,7 +3326,7 @@
     </p:spTree>
     <p:extLst>
       <p:ext uri="{BB962C8B-B14F-4D97-AF65-F5344CB8AC3E}">
-        <p14:creationId xmlns:p14="http://schemas.microsoft.com/office/powerpoint/2010/main" val="904771524"/>
+        <p14:creationId xmlns:p14="http://schemas.microsoft.com/office/powerpoint/2010/main" val="552190393"/>
       </p:ext>
     </p:extLst>
   </p:cSld>
@@ -3294,7 +3370,7 @@
           <a:p>
             <a:r>
               <a:rPr lang="en-US" dirty="0" smtClean="0"/>
-              <a:t>Let’s Launch Into the Python Window!</a:t>
+              <a:t>Python Window in ArcMap</a:t>
             </a:r>
             <a:endParaRPr lang="en-US" dirty="0"/>
           </a:p>
@@ -3302,27 +3378,51 @@
       </p:sp>
       <p:sp>
         <p:nvSpPr>
-          <p:cNvPr id="5" name="Text Placeholder 4"/>
-          <p:cNvSpPr>
-            <a:spLocks noGrp="1"/>
-          </p:cNvSpPr>
-          <p:nvPr>
-            <p:ph type="body" idx="1"/>
-          </p:nvPr>
-        </p:nvSpPr>
-        <p:spPr/>
-        <p:txBody>
-          <a:bodyPr/>
-          <a:lstStyle/>
-          <a:p>
-            <a:endParaRPr lang="en-US"/>
-          </a:p>
-        </p:txBody>
-      </p:sp>
+          <p:cNvPr id="5" name="Content Placeholder 4"/>
+          <p:cNvSpPr>
+            <a:spLocks noGrp="1"/>
+          </p:cNvSpPr>
+          <p:nvPr>
+            <p:ph idx="1"/>
+          </p:nvPr>
+        </p:nvSpPr>
+        <p:spPr/>
+        <p:txBody>
+          <a:bodyPr/>
+          <a:lstStyle/>
+          <a:p>
+            <a:endParaRPr lang="en-US"/>
+          </a:p>
+        </p:txBody>
+      </p:sp>
+      <p:pic>
+        <p:nvPicPr>
+          <p:cNvPr id="2" name="Picture 1"/>
+          <p:cNvPicPr>
+            <a:picLocks noChangeAspect="1"/>
+          </p:cNvPicPr>
+          <p:nvPr/>
+        </p:nvPicPr>
+        <p:blipFill>
+          <a:blip r:embed="rId2"/>
+          <a:stretch>
+            <a:fillRect/>
+          </a:stretch>
+        </p:blipFill>
+        <p:spPr>
+          <a:xfrm>
+            <a:off x="1162602" y="1307928"/>
+            <a:ext cx="9866795" cy="5550072"/>
+          </a:xfrm>
+          <a:prstGeom prst="rect">
+            <a:avLst/>
+          </a:prstGeom>
+        </p:spPr>
+      </p:pic>
     </p:spTree>
     <p:extLst>
       <p:ext uri="{BB962C8B-B14F-4D97-AF65-F5344CB8AC3E}">
-        <p14:creationId xmlns:p14="http://schemas.microsoft.com/office/powerpoint/2010/main" val="1510889796"/>
+        <p14:creationId xmlns:p14="http://schemas.microsoft.com/office/powerpoint/2010/main" val="1057939983"/>
       </p:ext>
     </p:extLst>
   </p:cSld>
@@ -3365,8 +3465,8 @@
           <a:lstStyle/>
           <a:p>
             <a:r>
-              <a:rPr lang="en-US" dirty="0" err="1" smtClean="0"/>
-              <a:t>Arcpy</a:t>
+              <a:rPr lang="en-US" dirty="0" smtClean="0"/>
+              <a:t>Writing Code</a:t>
             </a:r>
             <a:endParaRPr lang="en-US" dirty="0"/>
           </a:p>
@@ -3374,27 +3474,593 @@
       </p:sp>
       <p:sp>
         <p:nvSpPr>
-          <p:cNvPr id="3" name="Text Placeholder 2"/>
-          <p:cNvSpPr>
-            <a:spLocks noGrp="1"/>
-          </p:cNvSpPr>
-          <p:nvPr>
-            <p:ph type="body" idx="1"/>
-          </p:nvPr>
-        </p:nvSpPr>
-        <p:spPr/>
-        <p:txBody>
-          <a:bodyPr/>
-          <a:lstStyle/>
-          <a:p>
-            <a:endParaRPr lang="en-US"/>
-          </a:p>
-        </p:txBody>
-      </p:sp>
+          <p:cNvPr id="3" name="Content Placeholder 2"/>
+          <p:cNvSpPr>
+            <a:spLocks noGrp="1"/>
+          </p:cNvSpPr>
+          <p:nvPr>
+            <p:ph idx="1"/>
+          </p:nvPr>
+        </p:nvSpPr>
+        <p:spPr/>
+        <p:txBody>
+          <a:bodyPr/>
+          <a:lstStyle/>
+          <a:p>
+            <a:r>
+              <a:rPr lang="en-US" dirty="0" smtClean="0"/>
+              <a:t>A place for writing Python code in </a:t>
+            </a:r>
+            <a:r>
+              <a:rPr lang="en-US" dirty="0" smtClean="0"/>
+              <a:t>A</a:t>
+            </a:r>
+            <a:r>
+              <a:rPr lang="en-US" dirty="0" smtClean="0"/>
+              <a:t>rcMap</a:t>
+            </a:r>
+          </a:p>
+          <a:p>
+            <a:r>
+              <a:rPr lang="en-US" dirty="0" smtClean="0"/>
+              <a:t>GP tools accessible through Python Window</a:t>
+            </a:r>
+          </a:p>
+          <a:p>
+            <a:r>
+              <a:rPr lang="en-US" dirty="0" smtClean="0"/>
+              <a:t>Code completion in Python Window!</a:t>
+            </a:r>
+          </a:p>
+          <a:p>
+            <a:r>
+              <a:rPr lang="en-US" dirty="0" smtClean="0"/>
+              <a:t>Any standard modules should be accessible</a:t>
+            </a:r>
+            <a:endParaRPr lang="en-US" dirty="0"/>
+          </a:p>
+        </p:txBody>
+      </p:sp>
+      <p:pic>
+        <p:nvPicPr>
+          <p:cNvPr id="4" name="Picture 3"/>
+          <p:cNvPicPr>
+            <a:picLocks noChangeAspect="1"/>
+          </p:cNvPicPr>
+          <p:nvPr/>
+        </p:nvPicPr>
+        <p:blipFill>
+          <a:blip r:embed="rId2"/>
+          <a:stretch>
+            <a:fillRect/>
+          </a:stretch>
+        </p:blipFill>
+        <p:spPr>
+          <a:xfrm>
+            <a:off x="504825" y="3986213"/>
+            <a:ext cx="11182350" cy="2190750"/>
+          </a:xfrm>
+          <a:prstGeom prst="rect">
+            <a:avLst/>
+          </a:prstGeom>
+        </p:spPr>
+      </p:pic>
     </p:spTree>
     <p:extLst>
       <p:ext uri="{BB962C8B-B14F-4D97-AF65-F5344CB8AC3E}">
-        <p14:creationId xmlns:p14="http://schemas.microsoft.com/office/powerpoint/2010/main" val="3742938750"/>
+        <p14:creationId xmlns:p14="http://schemas.microsoft.com/office/powerpoint/2010/main" val="3607242760"/>
+      </p:ext>
+    </p:extLst>
+  </p:cSld>
+  <p:clrMapOvr>
+    <a:masterClrMapping/>
+  </p:clrMapOvr>
+</p:sld>
+</file>
+
+<file path=ppt/slides/slide15.xml><?xml version="1.0" encoding="utf-8"?>
+<p:sld xmlns:a="http://schemas.openxmlformats.org/drawingml/2006/main" xmlns:r="http://schemas.openxmlformats.org/officeDocument/2006/relationships" xmlns:p="http://schemas.openxmlformats.org/presentationml/2006/main">
+  <p:cSld>
+    <p:spTree>
+      <p:nvGrpSpPr>
+        <p:cNvPr id="1" name=""/>
+        <p:cNvGrpSpPr/>
+        <p:nvPr/>
+      </p:nvGrpSpPr>
+      <p:grpSpPr>
+        <a:xfrm>
+          <a:off x="0" y="0"/>
+          <a:ext cx="0" cy="0"/>
+          <a:chOff x="0" y="0"/>
+          <a:chExt cx="0" cy="0"/>
+        </a:xfrm>
+      </p:grpSpPr>
+      <p:sp>
+        <p:nvSpPr>
+          <p:cNvPr id="2" name="Title 1"/>
+          <p:cNvSpPr>
+            <a:spLocks noGrp="1"/>
+          </p:cNvSpPr>
+          <p:nvPr>
+            <p:ph type="title"/>
+          </p:nvPr>
+        </p:nvSpPr>
+        <p:spPr/>
+        <p:txBody>
+          <a:bodyPr/>
+          <a:lstStyle/>
+          <a:p>
+            <a:r>
+              <a:rPr lang="en-US" dirty="0" smtClean="0"/>
+              <a:t>Getting Help</a:t>
+            </a:r>
+            <a:endParaRPr lang="en-US" dirty="0"/>
+          </a:p>
+        </p:txBody>
+      </p:sp>
+      <p:sp>
+        <p:nvSpPr>
+          <p:cNvPr id="3" name="Content Placeholder 2"/>
+          <p:cNvSpPr>
+            <a:spLocks noGrp="1"/>
+          </p:cNvSpPr>
+          <p:nvPr>
+            <p:ph idx="1"/>
+          </p:nvPr>
+        </p:nvSpPr>
+        <p:spPr/>
+        <p:txBody>
+          <a:bodyPr/>
+          <a:lstStyle/>
+          <a:p>
+            <a:r>
+              <a:rPr lang="en-US" dirty="0" smtClean="0"/>
+              <a:t>Code completion</a:t>
+            </a:r>
+            <a:endParaRPr lang="en-US" dirty="0"/>
+          </a:p>
+        </p:txBody>
+      </p:sp>
+      <p:pic>
+        <p:nvPicPr>
+          <p:cNvPr id="4" name="Picture 3"/>
+          <p:cNvPicPr>
+            <a:picLocks noChangeAspect="1"/>
+          </p:cNvPicPr>
+          <p:nvPr/>
+        </p:nvPicPr>
+        <p:blipFill>
+          <a:blip r:embed="rId2"/>
+          <a:stretch>
+            <a:fillRect/>
+          </a:stretch>
+        </p:blipFill>
+        <p:spPr>
+          <a:xfrm>
+            <a:off x="2024062" y="2536825"/>
+            <a:ext cx="8143875" cy="2190750"/>
+          </a:xfrm>
+          <a:prstGeom prst="rect">
+            <a:avLst/>
+          </a:prstGeom>
+        </p:spPr>
+      </p:pic>
+    </p:spTree>
+    <p:extLst>
+      <p:ext uri="{BB962C8B-B14F-4D97-AF65-F5344CB8AC3E}">
+        <p14:creationId xmlns:p14="http://schemas.microsoft.com/office/powerpoint/2010/main" val="904771524"/>
+      </p:ext>
+    </p:extLst>
+  </p:cSld>
+  <p:clrMapOvr>
+    <a:masterClrMapping/>
+  </p:clrMapOvr>
+</p:sld>
+</file>
+
+<file path=ppt/slides/slide16.xml><?xml version="1.0" encoding="utf-8"?>
+<p:sld xmlns:a="http://schemas.openxmlformats.org/drawingml/2006/main" xmlns:r="http://schemas.openxmlformats.org/officeDocument/2006/relationships" xmlns:p="http://schemas.openxmlformats.org/presentationml/2006/main">
+  <p:cSld>
+    <p:spTree>
+      <p:nvGrpSpPr>
+        <p:cNvPr id="1" name=""/>
+        <p:cNvGrpSpPr/>
+        <p:nvPr/>
+      </p:nvGrpSpPr>
+      <p:grpSpPr>
+        <a:xfrm>
+          <a:off x="0" y="0"/>
+          <a:ext cx="0" cy="0"/>
+          <a:chOff x="0" y="0"/>
+          <a:chExt cx="0" cy="0"/>
+        </a:xfrm>
+      </p:grpSpPr>
+      <p:sp>
+        <p:nvSpPr>
+          <p:cNvPr id="2" name="Title 1"/>
+          <p:cNvSpPr>
+            <a:spLocks noGrp="1"/>
+          </p:cNvSpPr>
+          <p:nvPr>
+            <p:ph type="title"/>
+          </p:nvPr>
+        </p:nvSpPr>
+        <p:spPr/>
+        <p:txBody>
+          <a:bodyPr/>
+          <a:lstStyle/>
+          <a:p>
+            <a:r>
+              <a:rPr lang="en-US" dirty="0" smtClean="0"/>
+              <a:t>Getting </a:t>
+            </a:r>
+            <a:r>
+              <a:rPr lang="en-US" dirty="0" smtClean="0"/>
+              <a:t>Assistance</a:t>
+            </a:r>
+            <a:endParaRPr lang="en-US" dirty="0"/>
+          </a:p>
+        </p:txBody>
+      </p:sp>
+      <p:sp>
+        <p:nvSpPr>
+          <p:cNvPr id="3" name="Content Placeholder 2"/>
+          <p:cNvSpPr>
+            <a:spLocks noGrp="1"/>
+          </p:cNvSpPr>
+          <p:nvPr>
+            <p:ph idx="1"/>
+          </p:nvPr>
+        </p:nvSpPr>
+        <p:spPr/>
+        <p:txBody>
+          <a:bodyPr/>
+          <a:lstStyle/>
+          <a:p>
+            <a:r>
+              <a:rPr lang="en-US" dirty="0" smtClean="0"/>
+              <a:t>F1</a:t>
+            </a:r>
+            <a:endParaRPr lang="en-US" dirty="0"/>
+          </a:p>
+        </p:txBody>
+      </p:sp>
+      <p:pic>
+        <p:nvPicPr>
+          <p:cNvPr id="5" name="Picture 4"/>
+          <p:cNvPicPr>
+            <a:picLocks noChangeAspect="1"/>
+          </p:cNvPicPr>
+          <p:nvPr/>
+        </p:nvPicPr>
+        <p:blipFill>
+          <a:blip r:embed="rId2"/>
+          <a:stretch>
+            <a:fillRect/>
+          </a:stretch>
+        </p:blipFill>
+        <p:spPr>
+          <a:xfrm>
+            <a:off x="2024062" y="2333625"/>
+            <a:ext cx="8143875" cy="2190750"/>
+          </a:xfrm>
+          <a:prstGeom prst="rect">
+            <a:avLst/>
+          </a:prstGeom>
+        </p:spPr>
+      </p:pic>
+    </p:spTree>
+    <p:extLst>
+      <p:ext uri="{BB962C8B-B14F-4D97-AF65-F5344CB8AC3E}">
+        <p14:creationId xmlns:p14="http://schemas.microsoft.com/office/powerpoint/2010/main" val="1542097700"/>
+      </p:ext>
+    </p:extLst>
+  </p:cSld>
+  <p:clrMapOvr>
+    <a:masterClrMapping/>
+  </p:clrMapOvr>
+</p:sld>
+</file>
+
+<file path=ppt/slides/slide17.xml><?xml version="1.0" encoding="utf-8"?>
+<p:sld xmlns:a="http://schemas.openxmlformats.org/drawingml/2006/main" xmlns:r="http://schemas.openxmlformats.org/officeDocument/2006/relationships" xmlns:p="http://schemas.openxmlformats.org/presentationml/2006/main">
+  <p:cSld>
+    <p:spTree>
+      <p:nvGrpSpPr>
+        <p:cNvPr id="1" name=""/>
+        <p:cNvGrpSpPr/>
+        <p:nvPr/>
+      </p:nvGrpSpPr>
+      <p:grpSpPr>
+        <a:xfrm>
+          <a:off x="0" y="0"/>
+          <a:ext cx="0" cy="0"/>
+          <a:chOff x="0" y="0"/>
+          <a:chExt cx="0" cy="0"/>
+        </a:xfrm>
+      </p:grpSpPr>
+      <p:sp>
+        <p:nvSpPr>
+          <p:cNvPr id="2" name="Title 1"/>
+          <p:cNvSpPr>
+            <a:spLocks noGrp="1"/>
+          </p:cNvSpPr>
+          <p:nvPr>
+            <p:ph type="title"/>
+          </p:nvPr>
+        </p:nvSpPr>
+        <p:spPr/>
+        <p:txBody>
+          <a:bodyPr/>
+          <a:lstStyle/>
+          <a:p>
+            <a:r>
+              <a:rPr lang="en-US" dirty="0" smtClean="0"/>
+              <a:t>Getting </a:t>
+            </a:r>
+            <a:r>
+              <a:rPr lang="en-US" dirty="0" smtClean="0"/>
+              <a:t>Assistance</a:t>
+            </a:r>
+            <a:endParaRPr lang="en-US" dirty="0"/>
+          </a:p>
+        </p:txBody>
+      </p:sp>
+      <p:sp>
+        <p:nvSpPr>
+          <p:cNvPr id="3" name="Content Placeholder 2"/>
+          <p:cNvSpPr>
+            <a:spLocks noGrp="1"/>
+          </p:cNvSpPr>
+          <p:nvPr>
+            <p:ph idx="1"/>
+          </p:nvPr>
+        </p:nvSpPr>
+        <p:spPr/>
+        <p:txBody>
+          <a:bodyPr/>
+          <a:lstStyle/>
+          <a:p>
+            <a:r>
+              <a:rPr lang="en-US" dirty="0" smtClean="0"/>
+              <a:t>F2 – Checks for syntax errors</a:t>
+            </a:r>
+            <a:endParaRPr lang="en-US" dirty="0"/>
+          </a:p>
+        </p:txBody>
+      </p:sp>
+      <p:pic>
+        <p:nvPicPr>
+          <p:cNvPr id="4" name="Picture 3"/>
+          <p:cNvPicPr>
+            <a:picLocks noChangeAspect="1"/>
+          </p:cNvPicPr>
+          <p:nvPr/>
+        </p:nvPicPr>
+        <p:blipFill>
+          <a:blip r:embed="rId2"/>
+          <a:stretch>
+            <a:fillRect/>
+          </a:stretch>
+        </p:blipFill>
+        <p:spPr>
+          <a:xfrm>
+            <a:off x="2024062" y="2333625"/>
+            <a:ext cx="8143875" cy="2190750"/>
+          </a:xfrm>
+          <a:prstGeom prst="rect">
+            <a:avLst/>
+          </a:prstGeom>
+        </p:spPr>
+      </p:pic>
+    </p:spTree>
+    <p:extLst>
+      <p:ext uri="{BB962C8B-B14F-4D97-AF65-F5344CB8AC3E}">
+        <p14:creationId xmlns:p14="http://schemas.microsoft.com/office/powerpoint/2010/main" val="618004476"/>
+      </p:ext>
+    </p:extLst>
+  </p:cSld>
+  <p:clrMapOvr>
+    <a:masterClrMapping/>
+  </p:clrMapOvr>
+</p:sld>
+</file>
+
+<file path=ppt/slides/slide18.xml><?xml version="1.0" encoding="utf-8"?>
+<p:sld xmlns:a="http://schemas.openxmlformats.org/drawingml/2006/main" xmlns:r="http://schemas.openxmlformats.org/officeDocument/2006/relationships" xmlns:p="http://schemas.openxmlformats.org/presentationml/2006/main">
+  <p:cSld>
+    <p:spTree>
+      <p:nvGrpSpPr>
+        <p:cNvPr id="1" name=""/>
+        <p:cNvGrpSpPr/>
+        <p:nvPr/>
+      </p:nvGrpSpPr>
+      <p:grpSpPr>
+        <a:xfrm>
+          <a:off x="0" y="0"/>
+          <a:ext cx="0" cy="0"/>
+          <a:chOff x="0" y="0"/>
+          <a:chExt cx="0" cy="0"/>
+        </a:xfrm>
+      </p:grpSpPr>
+      <p:sp>
+        <p:nvSpPr>
+          <p:cNvPr id="2" name="Title 1"/>
+          <p:cNvSpPr>
+            <a:spLocks noGrp="1"/>
+          </p:cNvSpPr>
+          <p:nvPr>
+            <p:ph type="title"/>
+          </p:nvPr>
+        </p:nvSpPr>
+        <p:spPr/>
+        <p:txBody>
+          <a:bodyPr/>
+          <a:lstStyle/>
+          <a:p>
+            <a:r>
+              <a:rPr lang="en-US" dirty="0" smtClean="0"/>
+              <a:t>Saving </a:t>
+            </a:r>
+            <a:r>
+              <a:rPr lang="en-US" dirty="0"/>
+              <a:t>Y</a:t>
+            </a:r>
+            <a:r>
+              <a:rPr lang="en-US" dirty="0" smtClean="0"/>
+              <a:t>our Session</a:t>
+            </a:r>
+            <a:endParaRPr lang="en-US" dirty="0"/>
+          </a:p>
+        </p:txBody>
+      </p:sp>
+      <p:sp>
+        <p:nvSpPr>
+          <p:cNvPr id="3" name="Content Placeholder 2"/>
+          <p:cNvSpPr>
+            <a:spLocks noGrp="1"/>
+          </p:cNvSpPr>
+          <p:nvPr>
+            <p:ph idx="1"/>
+          </p:nvPr>
+        </p:nvSpPr>
+        <p:spPr/>
+        <p:txBody>
+          <a:bodyPr/>
+          <a:lstStyle/>
+          <a:p>
+            <a:endParaRPr lang="en-US"/>
+          </a:p>
+        </p:txBody>
+      </p:sp>
+      <p:pic>
+        <p:nvPicPr>
+          <p:cNvPr id="4" name="Picture 3"/>
+          <p:cNvPicPr>
+            <a:picLocks noChangeAspect="1"/>
+          </p:cNvPicPr>
+          <p:nvPr/>
+        </p:nvPicPr>
+        <p:blipFill>
+          <a:blip r:embed="rId2"/>
+          <a:stretch>
+            <a:fillRect/>
+          </a:stretch>
+        </p:blipFill>
+        <p:spPr>
+          <a:xfrm>
+            <a:off x="1232453" y="1690688"/>
+            <a:ext cx="9356034" cy="5262769"/>
+          </a:xfrm>
+          <a:prstGeom prst="rect">
+            <a:avLst/>
+          </a:prstGeom>
+        </p:spPr>
+      </p:pic>
+    </p:spTree>
+    <p:extLst>
+      <p:ext uri="{BB962C8B-B14F-4D97-AF65-F5344CB8AC3E}">
+        <p14:creationId xmlns:p14="http://schemas.microsoft.com/office/powerpoint/2010/main" val="2454711553"/>
+      </p:ext>
+    </p:extLst>
+  </p:cSld>
+  <p:clrMapOvr>
+    <a:masterClrMapping/>
+  </p:clrMapOvr>
+</p:sld>
+</file>
+
+<file path=ppt/slides/slide19.xml><?xml version="1.0" encoding="utf-8"?>
+<p:sld xmlns:a="http://schemas.openxmlformats.org/drawingml/2006/main" xmlns:r="http://schemas.openxmlformats.org/officeDocument/2006/relationships" xmlns:p="http://schemas.openxmlformats.org/presentationml/2006/main">
+  <p:cSld>
+    <p:spTree>
+      <p:nvGrpSpPr>
+        <p:cNvPr id="1" name=""/>
+        <p:cNvGrpSpPr/>
+        <p:nvPr/>
+      </p:nvGrpSpPr>
+      <p:grpSpPr>
+        <a:xfrm>
+          <a:off x="0" y="0"/>
+          <a:ext cx="0" cy="0"/>
+          <a:chOff x="0" y="0"/>
+          <a:chExt cx="0" cy="0"/>
+        </a:xfrm>
+      </p:grpSpPr>
+      <p:sp>
+        <p:nvSpPr>
+          <p:cNvPr id="2" name="Title 1"/>
+          <p:cNvSpPr>
+            <a:spLocks noGrp="1"/>
+          </p:cNvSpPr>
+          <p:nvPr>
+            <p:ph type="title"/>
+          </p:nvPr>
+        </p:nvSpPr>
+        <p:spPr/>
+        <p:txBody>
+          <a:bodyPr/>
+          <a:lstStyle/>
+          <a:p>
+            <a:r>
+              <a:rPr lang="en-US" dirty="0" smtClean="0"/>
+              <a:t>Loading Code</a:t>
+            </a:r>
+            <a:endParaRPr lang="en-US" dirty="0"/>
+          </a:p>
+        </p:txBody>
+      </p:sp>
+      <p:sp>
+        <p:nvSpPr>
+          <p:cNvPr id="3" name="Content Placeholder 2"/>
+          <p:cNvSpPr>
+            <a:spLocks noGrp="1"/>
+          </p:cNvSpPr>
+          <p:nvPr>
+            <p:ph idx="1"/>
+          </p:nvPr>
+        </p:nvSpPr>
+        <p:spPr/>
+        <p:txBody>
+          <a:bodyPr/>
+          <a:lstStyle/>
+          <a:p>
+            <a:r>
+              <a:rPr lang="en-US" dirty="0" smtClean="0"/>
+              <a:t>You can also load and run scripts through the Python Window</a:t>
+            </a:r>
+            <a:endParaRPr lang="en-US" dirty="0"/>
+          </a:p>
+        </p:txBody>
+      </p:sp>
+      <p:pic>
+        <p:nvPicPr>
+          <p:cNvPr id="4" name="Picture 3"/>
+          <p:cNvPicPr>
+            <a:picLocks noChangeAspect="1"/>
+          </p:cNvPicPr>
+          <p:nvPr/>
+        </p:nvPicPr>
+        <p:blipFill>
+          <a:blip r:embed="rId2"/>
+          <a:stretch>
+            <a:fillRect/>
+          </a:stretch>
+        </p:blipFill>
+        <p:spPr>
+          <a:xfrm>
+            <a:off x="588802" y="2709360"/>
+            <a:ext cx="11014396" cy="6195598"/>
+          </a:xfrm>
+          <a:prstGeom prst="rect">
+            <a:avLst/>
+          </a:prstGeom>
+        </p:spPr>
+      </p:pic>
+    </p:spTree>
+    <p:extLst>
+      <p:ext uri="{BB962C8B-B14F-4D97-AF65-F5344CB8AC3E}">
+        <p14:creationId xmlns:p14="http://schemas.microsoft.com/office/powerpoint/2010/main" val="3529032421"/>
       </p:ext>
     </p:extLst>
   </p:cSld>
@@ -3476,6 +4142,160 @@
 </p:sld>
 </file>
 
+<file path=ppt/slides/slide20.xml><?xml version="1.0" encoding="utf-8"?>
+<p:sld xmlns:a="http://schemas.openxmlformats.org/drawingml/2006/main" xmlns:r="http://schemas.openxmlformats.org/officeDocument/2006/relationships" xmlns:p="http://schemas.openxmlformats.org/presentationml/2006/main">
+  <p:cSld>
+    <p:spTree>
+      <p:nvGrpSpPr>
+        <p:cNvPr id="1" name=""/>
+        <p:cNvGrpSpPr/>
+        <p:nvPr/>
+      </p:nvGrpSpPr>
+      <p:grpSpPr>
+        <a:xfrm>
+          <a:off x="0" y="0"/>
+          <a:ext cx="0" cy="0"/>
+          <a:chOff x="0" y="0"/>
+          <a:chExt cx="0" cy="0"/>
+        </a:xfrm>
+      </p:grpSpPr>
+      <p:sp>
+        <p:nvSpPr>
+          <p:cNvPr id="2" name="Title 1"/>
+          <p:cNvSpPr>
+            <a:spLocks noGrp="1"/>
+          </p:cNvSpPr>
+          <p:nvPr>
+            <p:ph type="title"/>
+          </p:nvPr>
+        </p:nvSpPr>
+        <p:spPr/>
+        <p:txBody>
+          <a:bodyPr/>
+          <a:lstStyle/>
+          <a:p>
+            <a:r>
+              <a:rPr lang="en-US" dirty="0" smtClean="0"/>
+              <a:t>All of this to say…</a:t>
+            </a:r>
+            <a:endParaRPr lang="en-US" dirty="0"/>
+          </a:p>
+        </p:txBody>
+      </p:sp>
+      <p:sp>
+        <p:nvSpPr>
+          <p:cNvPr id="3" name="Content Placeholder 2"/>
+          <p:cNvSpPr>
+            <a:spLocks noGrp="1"/>
+          </p:cNvSpPr>
+          <p:nvPr>
+            <p:ph idx="1"/>
+          </p:nvPr>
+        </p:nvSpPr>
+        <p:spPr/>
+        <p:txBody>
+          <a:bodyPr/>
+          <a:lstStyle/>
+          <a:p>
+            <a:r>
+              <a:rPr lang="en-US" dirty="0" smtClean="0"/>
+              <a:t>You probably won’t use the Python Window too much </a:t>
+            </a:r>
+            <a:r>
+              <a:rPr lang="en-US" dirty="0" smtClean="0">
+                <a:sym typeface="Wingdings" panose="05000000000000000000" pitchFamily="2" charset="2"/>
+              </a:rPr>
+              <a:t></a:t>
+            </a:r>
+            <a:endParaRPr lang="en-US" dirty="0"/>
+          </a:p>
+        </p:txBody>
+      </p:sp>
+    </p:spTree>
+    <p:extLst>
+      <p:ext uri="{BB962C8B-B14F-4D97-AF65-F5344CB8AC3E}">
+        <p14:creationId xmlns:p14="http://schemas.microsoft.com/office/powerpoint/2010/main" val="4007216660"/>
+      </p:ext>
+    </p:extLst>
+  </p:cSld>
+  <p:clrMapOvr>
+    <a:masterClrMapping/>
+  </p:clrMapOvr>
+</p:sld>
+</file>
+
+<file path=ppt/slides/slide21.xml><?xml version="1.0" encoding="utf-8"?>
+<p:sld xmlns:a="http://schemas.openxmlformats.org/drawingml/2006/main" xmlns:r="http://schemas.openxmlformats.org/officeDocument/2006/relationships" xmlns:p="http://schemas.openxmlformats.org/presentationml/2006/main">
+  <p:cSld>
+    <p:spTree>
+      <p:nvGrpSpPr>
+        <p:cNvPr id="1" name=""/>
+        <p:cNvGrpSpPr/>
+        <p:nvPr/>
+      </p:nvGrpSpPr>
+      <p:grpSpPr>
+        <a:xfrm>
+          <a:off x="0" y="0"/>
+          <a:ext cx="0" cy="0"/>
+          <a:chOff x="0" y="0"/>
+          <a:chExt cx="0" cy="0"/>
+        </a:xfrm>
+      </p:grpSpPr>
+      <p:sp>
+        <p:nvSpPr>
+          <p:cNvPr id="4" name="Title 3"/>
+          <p:cNvSpPr>
+            <a:spLocks noGrp="1"/>
+          </p:cNvSpPr>
+          <p:nvPr>
+            <p:ph type="title"/>
+          </p:nvPr>
+        </p:nvSpPr>
+        <p:spPr/>
+        <p:txBody>
+          <a:bodyPr/>
+          <a:lstStyle/>
+          <a:p>
+            <a:r>
+              <a:rPr lang="en-US" dirty="0" smtClean="0"/>
+              <a:t>Let’s Launch Into the Python Window!</a:t>
+            </a:r>
+            <a:endParaRPr lang="en-US" dirty="0"/>
+          </a:p>
+        </p:txBody>
+      </p:sp>
+      <p:sp>
+        <p:nvSpPr>
+          <p:cNvPr id="5" name="Text Placeholder 4"/>
+          <p:cNvSpPr>
+            <a:spLocks noGrp="1"/>
+          </p:cNvSpPr>
+          <p:nvPr>
+            <p:ph type="body" idx="1"/>
+          </p:nvPr>
+        </p:nvSpPr>
+        <p:spPr/>
+        <p:txBody>
+          <a:bodyPr/>
+          <a:lstStyle/>
+          <a:p>
+            <a:endParaRPr lang="en-US"/>
+          </a:p>
+        </p:txBody>
+      </p:sp>
+    </p:spTree>
+    <p:extLst>
+      <p:ext uri="{BB962C8B-B14F-4D97-AF65-F5344CB8AC3E}">
+        <p14:creationId xmlns:p14="http://schemas.microsoft.com/office/powerpoint/2010/main" val="1510889796"/>
+      </p:ext>
+    </p:extLst>
+  </p:cSld>
+  <p:clrMapOvr>
+    <a:masterClrMapping/>
+  </p:clrMapOvr>
+</p:sld>
+</file>
+
 <file path=ppt/slides/slide3.xml><?xml version="1.0" encoding="utf-8"?>
 <p:sld xmlns:a="http://schemas.openxmlformats.org/drawingml/2006/main" xmlns:r="http://schemas.openxmlformats.org/officeDocument/2006/relationships" xmlns:p="http://schemas.openxmlformats.org/presentationml/2006/main">
   <p:cSld>
@@ -3535,10 +4355,56 @@
           <a:bodyPr/>
           <a:lstStyle/>
           <a:p>
-            <a:endParaRPr lang="en-US"/>
-          </a:p>
-        </p:txBody>
-      </p:sp>
+            <a:r>
+              <a:rPr lang="en-US" dirty="0" smtClean="0"/>
+              <a:t>Spatial analysis</a:t>
+            </a:r>
+          </a:p>
+          <a:p>
+            <a:endParaRPr lang="en-US" dirty="0" smtClean="0"/>
+          </a:p>
+          <a:p>
+            <a:r>
+              <a:rPr lang="en-US" dirty="0" smtClean="0"/>
+              <a:t>Data modeling</a:t>
+            </a:r>
+          </a:p>
+          <a:p>
+            <a:endParaRPr lang="en-US" dirty="0" smtClean="0"/>
+          </a:p>
+          <a:p>
+            <a:r>
+              <a:rPr lang="en-US" dirty="0" smtClean="0"/>
+              <a:t>Task automation</a:t>
+            </a:r>
+            <a:endParaRPr lang="en-US" dirty="0"/>
+          </a:p>
+        </p:txBody>
+      </p:sp>
+      <p:pic>
+        <p:nvPicPr>
+          <p:cNvPr id="2" name="Picture 1"/>
+          <p:cNvPicPr>
+            <a:picLocks noChangeAspect="1"/>
+          </p:cNvPicPr>
+          <p:nvPr/>
+        </p:nvPicPr>
+        <p:blipFill>
+          <a:blip r:embed="rId2"/>
+          <a:stretch>
+            <a:fillRect/>
+          </a:stretch>
+        </p:blipFill>
+        <p:spPr>
+          <a:xfrm>
+            <a:off x="4573587" y="1372394"/>
+            <a:ext cx="6981825" cy="5257800"/>
+          </a:xfrm>
+          <a:prstGeom prst="rect">
+            <a:avLst/>
+          </a:prstGeom>
+        </p:spPr>
+      </p:pic>
     </p:spTree>
     <p:extLst>
       <p:ext uri="{BB962C8B-B14F-4D97-AF65-F5344CB8AC3E}">
@@ -3611,6 +4477,30 @@
           </a:p>
         </p:txBody>
       </p:sp>
+      <p:pic>
+        <p:nvPicPr>
+          <p:cNvPr id="4" name="Picture 3"/>
+          <p:cNvPicPr>
+            <a:picLocks noChangeAspect="1"/>
+          </p:cNvPicPr>
+          <p:nvPr/>
+        </p:nvPicPr>
+        <p:blipFill>
+          <a:blip r:embed="rId2"/>
+          <a:stretch>
+            <a:fillRect/>
+          </a:stretch>
+        </p:blipFill>
+        <p:spPr>
+          <a:xfrm>
+            <a:off x="3736975" y="1485900"/>
+            <a:ext cx="4514850" cy="7696200"/>
+          </a:xfrm>
+          <a:prstGeom prst="rect">
+            <a:avLst/>
+          </a:prstGeom>
+        </p:spPr>
+      </p:pic>
     </p:spTree>
     <p:extLst>
       <p:ext uri="{BB962C8B-B14F-4D97-AF65-F5344CB8AC3E}">
@@ -3658,7 +4548,7 @@
           <a:p>
             <a:r>
               <a:rPr lang="en-US" dirty="0" smtClean="0"/>
-              <a:t>Environment Settings</a:t>
+              <a:t>Toolboxes and Tools</a:t>
             </a:r>
             <a:endParaRPr lang="en-US" dirty="0"/>
           </a:p>
@@ -3674,19 +4564,52 @@
             <p:ph idx="1"/>
           </p:nvPr>
         </p:nvSpPr>
-        <p:spPr/>
-        <p:txBody>
-          <a:bodyPr/>
-          <a:lstStyle/>
-          <a:p>
-            <a:endParaRPr lang="en-US"/>
-          </a:p>
-        </p:txBody>
-      </p:sp>
+        <p:spPr>
+          <a:xfrm>
+            <a:off x="838200" y="1317625"/>
+            <a:ext cx="10515600" cy="4351338"/>
+          </a:xfrm>
+        </p:spPr>
+        <p:txBody>
+          <a:bodyPr/>
+          <a:lstStyle/>
+          <a:p>
+            <a:r>
+              <a:rPr lang="en-US" dirty="0" smtClean="0"/>
+              <a:t>Search – Still the easiest way to find the tool you want.</a:t>
+            </a:r>
+            <a:endParaRPr lang="en-US" dirty="0"/>
+          </a:p>
+        </p:txBody>
+      </p:sp>
+      <p:pic>
+        <p:nvPicPr>
+          <p:cNvPr id="5" name="Picture 4"/>
+          <p:cNvPicPr>
+            <a:picLocks noChangeAspect="1"/>
+          </p:cNvPicPr>
+          <p:nvPr/>
+        </p:nvPicPr>
+        <p:blipFill>
+          <a:blip r:embed="rId2"/>
+          <a:stretch>
+            <a:fillRect/>
+          </a:stretch>
+        </p:blipFill>
+        <p:spPr>
+          <a:xfrm>
+            <a:off x="4252912" y="1905000"/>
+            <a:ext cx="3381375" cy="5791200"/>
+          </a:xfrm>
+          <a:prstGeom prst="rect">
+            <a:avLst/>
+          </a:prstGeom>
+        </p:spPr>
+      </p:pic>
     </p:spTree>
     <p:extLst>
       <p:ext uri="{BB962C8B-B14F-4D97-AF65-F5344CB8AC3E}">
-        <p14:creationId xmlns:p14="http://schemas.microsoft.com/office/powerpoint/2010/main" val="342141028"/>
+        <p14:creationId xmlns:p14="http://schemas.microsoft.com/office/powerpoint/2010/main" val="257302949"/>
       </p:ext>
     </p:extLst>
   </p:cSld>
@@ -3730,11 +4653,7 @@
           <a:p>
             <a:r>
               <a:rPr lang="en-US" dirty="0" smtClean="0"/>
-              <a:t>Models and </a:t>
-            </a:r>
-            <a:r>
-              <a:rPr lang="en-US" dirty="0" err="1" smtClean="0"/>
-              <a:t>ModelBuilder</a:t>
+              <a:t>Example - Clip</a:t>
             </a:r>
             <a:endParaRPr lang="en-US" dirty="0"/>
           </a:p>
@@ -3759,10 +4678,34 @@
           </a:p>
         </p:txBody>
       </p:sp>
+      <p:pic>
+        <p:nvPicPr>
+          <p:cNvPr id="4" name="Picture 3"/>
+          <p:cNvPicPr>
+            <a:picLocks noChangeAspect="1"/>
+          </p:cNvPicPr>
+          <p:nvPr/>
+        </p:nvPicPr>
+        <p:blipFill>
+          <a:blip r:embed="rId2"/>
+          <a:stretch>
+            <a:fillRect/>
+          </a:stretch>
+        </p:blipFill>
+        <p:spPr>
+          <a:xfrm>
+            <a:off x="1652587" y="1371600"/>
+            <a:ext cx="8886825" cy="5486400"/>
+          </a:xfrm>
+          <a:prstGeom prst="rect">
+            <a:avLst/>
+          </a:prstGeom>
+        </p:spPr>
+      </p:pic>
     </p:spTree>
     <p:extLst>
       <p:ext uri="{BB962C8B-B14F-4D97-AF65-F5344CB8AC3E}">
-        <p14:creationId xmlns:p14="http://schemas.microsoft.com/office/powerpoint/2010/main" val="3334117002"/>
+        <p14:creationId xmlns:p14="http://schemas.microsoft.com/office/powerpoint/2010/main" val="342141028"/>
       </p:ext>
     </p:extLst>
   </p:cSld>
@@ -3806,7 +4749,7 @@
           <a:p>
             <a:r>
               <a:rPr lang="en-US" dirty="0" smtClean="0"/>
-              <a:t>Scripting with Python</a:t>
+              <a:t>Tool Help</a:t>
             </a:r>
             <a:endParaRPr lang="en-US" dirty="0"/>
           </a:p>
@@ -3822,19 +4765,52 @@
             <p:ph idx="1"/>
           </p:nvPr>
         </p:nvSpPr>
-        <p:spPr/>
-        <p:txBody>
-          <a:bodyPr/>
-          <a:lstStyle/>
-          <a:p>
-            <a:endParaRPr lang="en-US"/>
-          </a:p>
-        </p:txBody>
-      </p:sp>
+        <p:spPr>
+          <a:xfrm>
+            <a:off x="838200" y="1317625"/>
+            <a:ext cx="10515600" cy="4351338"/>
+          </a:xfrm>
+        </p:spPr>
+        <p:txBody>
+          <a:bodyPr/>
+          <a:lstStyle/>
+          <a:p>
+            <a:r>
+              <a:rPr lang="en-US" dirty="0" smtClean="0"/>
+              <a:t>Notice the Python snippets at the bottom</a:t>
+            </a:r>
+            <a:endParaRPr lang="en-US" dirty="0"/>
+          </a:p>
+        </p:txBody>
+      </p:sp>
+      <p:pic>
+        <p:nvPicPr>
+          <p:cNvPr id="4" name="Picture 3"/>
+          <p:cNvPicPr>
+            <a:picLocks noChangeAspect="1"/>
+          </p:cNvPicPr>
+          <p:nvPr/>
+        </p:nvPicPr>
+        <p:blipFill>
+          <a:blip r:embed="rId2"/>
+          <a:stretch>
+            <a:fillRect/>
+          </a:stretch>
+        </p:blipFill>
+        <p:spPr>
+          <a:xfrm>
+            <a:off x="2451100" y="1767559"/>
+            <a:ext cx="7297737" cy="5090441"/>
+          </a:xfrm>
+          <a:prstGeom prst="rect">
+            <a:avLst/>
+          </a:prstGeom>
+        </p:spPr>
+      </p:pic>
     </p:spTree>
     <p:extLst>
       <p:ext uri="{BB962C8B-B14F-4D97-AF65-F5344CB8AC3E}">
-        <p14:creationId xmlns:p14="http://schemas.microsoft.com/office/powerpoint/2010/main" val="2306883062"/>
+        <p14:creationId xmlns:p14="http://schemas.microsoft.com/office/powerpoint/2010/main" val="3516286994"/>
       </p:ext>
     </p:extLst>
   </p:cSld>
@@ -3878,7 +4854,7 @@
           <a:p>
             <a:r>
               <a:rPr lang="en-US" dirty="0" smtClean="0"/>
-              <a:t>Scripts as Tools</a:t>
+              <a:t>Environment Settings</a:t>
             </a:r>
             <a:endParaRPr lang="en-US" dirty="0"/>
           </a:p>
@@ -3899,14 +4875,38 @@
           <a:bodyPr/>
           <a:lstStyle/>
           <a:p>
-            <a:endParaRPr lang="en-US"/>
-          </a:p>
-        </p:txBody>
-      </p:sp>
+            <a:endParaRPr lang="en-US" dirty="0"/>
+          </a:p>
+        </p:txBody>
+      </p:sp>
+      <p:pic>
+        <p:nvPicPr>
+          <p:cNvPr id="4" name="Picture 3"/>
+          <p:cNvPicPr>
+            <a:picLocks noChangeAspect="1"/>
+          </p:cNvPicPr>
+          <p:nvPr/>
+        </p:nvPicPr>
+        <p:blipFill>
+          <a:blip r:embed="rId2"/>
+          <a:stretch>
+            <a:fillRect/>
+          </a:stretch>
+        </p:blipFill>
+        <p:spPr>
+          <a:xfrm>
+            <a:off x="1652587" y="1371600"/>
+            <a:ext cx="8886825" cy="5486400"/>
+          </a:xfrm>
+          <a:prstGeom prst="rect">
+            <a:avLst/>
+          </a:prstGeom>
+        </p:spPr>
+      </p:pic>
     </p:spTree>
     <p:extLst>
       <p:ext uri="{BB962C8B-B14F-4D97-AF65-F5344CB8AC3E}">
-        <p14:creationId xmlns:p14="http://schemas.microsoft.com/office/powerpoint/2010/main" val="2343102254"/>
+        <p14:creationId xmlns:p14="http://schemas.microsoft.com/office/powerpoint/2010/main" val="3893479364"/>
       </p:ext>
     </p:extLst>
   </p:cSld>
@@ -3935,7 +4935,7 @@
       </p:grpSpPr>
       <p:sp>
         <p:nvSpPr>
-          <p:cNvPr id="4" name="Title 3"/>
+          <p:cNvPr id="2" name="Title 1"/>
           <p:cNvSpPr>
             <a:spLocks noGrp="1"/>
           </p:cNvSpPr>
@@ -3950,7 +4950,11 @@
           <a:p>
             <a:r>
               <a:rPr lang="en-US" dirty="0" smtClean="0"/>
-              <a:t>The Python Window</a:t>
+              <a:t>Models and </a:t>
+            </a:r>
+            <a:r>
+              <a:rPr lang="en-US" dirty="0" err="1" smtClean="0"/>
+              <a:t>ModelBuilder</a:t>
             </a:r>
             <a:endParaRPr lang="en-US" dirty="0"/>
           </a:p>
@@ -3958,27 +4962,68 @@
       </p:sp>
       <p:sp>
         <p:nvSpPr>
-          <p:cNvPr id="5" name="Text Placeholder 4"/>
-          <p:cNvSpPr>
-            <a:spLocks noGrp="1"/>
-          </p:cNvSpPr>
-          <p:nvPr>
-            <p:ph type="body" idx="1"/>
-          </p:nvPr>
-        </p:nvSpPr>
-        <p:spPr/>
-        <p:txBody>
-          <a:bodyPr/>
-          <a:lstStyle/>
-          <a:p>
-            <a:endParaRPr lang="en-US"/>
-          </a:p>
-        </p:txBody>
-      </p:sp>
+          <p:cNvPr id="3" name="Content Placeholder 2"/>
+          <p:cNvSpPr>
+            <a:spLocks noGrp="1"/>
+          </p:cNvSpPr>
+          <p:nvPr>
+            <p:ph idx="1"/>
+          </p:nvPr>
+        </p:nvSpPr>
+        <p:spPr/>
+        <p:txBody>
+          <a:bodyPr/>
+          <a:lstStyle/>
+          <a:p>
+            <a:endParaRPr lang="en-US"/>
+          </a:p>
+        </p:txBody>
+      </p:sp>
+      <p:pic>
+        <p:nvPicPr>
+          <p:cNvPr id="1026" name="Picture 2" descr="Image result for arcgis model builder"/>
+          <p:cNvPicPr>
+            <a:picLocks noChangeAspect="1" noChangeArrowheads="1"/>
+          </p:cNvPicPr>
+          <p:nvPr/>
+        </p:nvPicPr>
+        <p:blipFill>
+          <a:blip r:embed="rId2">
+            <a:extLst>
+              <a:ext uri="{28A0092B-C50C-407E-A947-70E740481C1C}">
+                <a14:useLocalDpi xmlns:a14="http://schemas.microsoft.com/office/drawing/2010/main" val="0"/>
+              </a:ext>
+            </a:extLst>
+          </a:blip>
+          <a:srcRect/>
+          <a:stretch>
+            <a:fillRect/>
+          </a:stretch>
+        </p:blipFill>
+        <p:spPr bwMode="auto">
+          <a:xfrm>
+            <a:off x="1943100" y="1454054"/>
+            <a:ext cx="7635874" cy="6107208"/>
+          </a:xfrm>
+          <a:prstGeom prst="rect">
+            <a:avLst/>
+          </a:prstGeom>
+          <a:noFill/>
+          <a:extLst>
+            <a:ext uri="{909E8E84-426E-40DD-AFC4-6F175D3DCCD1}">
+              <a14:hiddenFill xmlns:a14="http://schemas.microsoft.com/office/drawing/2010/main">
+                <a:solidFill>
+                  <a:srgbClr val="FFFFFF"/>
+                </a:solidFill>
+              </a14:hiddenFill>
+            </a:ext>
+          </a:extLst>
+        </p:spPr>
+      </p:pic>
     </p:spTree>
     <p:extLst>
       <p:ext uri="{BB962C8B-B14F-4D97-AF65-F5344CB8AC3E}">
-        <p14:creationId xmlns:p14="http://schemas.microsoft.com/office/powerpoint/2010/main" val="552190393"/>
+        <p14:creationId xmlns:p14="http://schemas.microsoft.com/office/powerpoint/2010/main" val="3334117002"/>
       </p:ext>
     </p:extLst>
   </p:cSld>

</xml_diff>